<commit_message>
final version of slide
</commit_message>
<xml_diff>
--- a/DM_Project.pptx
+++ b/DM_Project.pptx
@@ -135,28 +135,16 @@
 
 <file path=ppt/charts/chart1.xml><?xml version="1.0" encoding="utf-8"?>
 <c:chartSpace xmlns:c="http://schemas.openxmlformats.org/drawingml/2006/chart" xmlns:a="http://schemas.openxmlformats.org/drawingml/2006/main" xmlns:r="http://schemas.openxmlformats.org/officeDocument/2006/relationships">
-  <c:date1904 val="0"/>
   <c:lang val="en-US"/>
-  <c:roundedCorners val="0"/>
-  <mc:AlternateContent xmlns:mc="http://schemas.openxmlformats.org/markup-compatibility/2006">
-    <mc:Choice xmlns:c14="http://schemas.microsoft.com/office/drawing/2007/8/2/chart" Requires="c14">
-      <c14:style val="116"/>
-    </mc:Choice>
-    <mc:Fallback>
-      <c:style val="16"/>
-    </mc:Fallback>
-  </mc:AlternateContent>
+  <c:style val="16"/>
   <c:chart>
     <c:title>
       <c:layout/>
-      <c:overlay val="0"/>
     </c:title>
-    <c:autoTitleDeleted val="0"/>
     <c:plotArea>
       <c:layout/>
       <c:lineChart>
         <c:grouping val="standard"/>
-        <c:varyColors val="0"/>
         <c:ser>
           <c:idx val="0"/>
           <c:order val="0"/>
@@ -178,19 +166,19 @@
                 <c:formatCode>m/d/yy</c:formatCode>
                 <c:ptCount val="5"/>
                 <c:pt idx="0">
-                  <c:v>39814.0</c:v>
+                  <c:v>39814</c:v>
                 </c:pt>
                 <c:pt idx="1">
-                  <c:v>41518.0</c:v>
+                  <c:v>41518</c:v>
                 </c:pt>
                 <c:pt idx="2">
-                  <c:v>41609.0</c:v>
+                  <c:v>41609</c:v>
                 </c:pt>
                 <c:pt idx="3">
-                  <c:v>42005.0</c:v>
+                  <c:v>42005</c:v>
                 </c:pt>
                 <c:pt idx="4">
-                  <c:v>42064.0</c:v>
+                  <c:v>42064</c:v>
                 </c:pt>
               </c:numCache>
             </c:numRef>
@@ -202,75 +190,58 @@
                 <c:formatCode>#,##0</c:formatCode>
                 <c:ptCount val="5"/>
                 <c:pt idx="0" formatCode="General">
-                  <c:v>0.0</c:v>
+                  <c:v>0</c:v>
                 </c:pt>
                 <c:pt idx="1">
-                  <c:v>1.0</c:v>
+                  <c:v>1</c:v>
                 </c:pt>
                 <c:pt idx="2">
-                  <c:v>13.0</c:v>
+                  <c:v>13</c:v>
                 </c:pt>
                 <c:pt idx="3">
-                  <c:v>3.0</c:v>
+                  <c:v>3</c:v>
                 </c:pt>
                 <c:pt idx="4">
-                  <c:v>3.0</c:v>
+                  <c:v>3</c:v>
                 </c:pt>
               </c:numCache>
             </c:numRef>
           </c:val>
-          <c:smooth val="0"/>
         </c:ser>
-        <c:dLbls>
-          <c:showLegendKey val="0"/>
-          <c:showVal val="0"/>
-          <c:showCatName val="0"/>
-          <c:showSerName val="0"/>
-          <c:showPercent val="0"/>
-          <c:showBubbleSize val="0"/>
-        </c:dLbls>
         <c:marker val="1"/>
-        <c:smooth val="0"/>
-        <c:axId val="2121674936"/>
-        <c:axId val="2121519800"/>
+        <c:axId val="67034496"/>
+        <c:axId val="67097728"/>
       </c:lineChart>
       <c:dateAx>
-        <c:axId val="2121674936"/>
+        <c:axId val="67034496"/>
         <c:scaling>
           <c:orientation val="minMax"/>
         </c:scaling>
-        <c:delete val="0"/>
         <c:axPos val="b"/>
         <c:numFmt formatCode="m/d/yy" sourceLinked="1"/>
-        <c:majorTickMark val="out"/>
-        <c:minorTickMark val="none"/>
         <c:tickLblPos val="nextTo"/>
-        <c:crossAx val="2121519800"/>
+        <c:crossAx val="67097728"/>
         <c:crosses val="autoZero"/>
         <c:auto val="1"/>
         <c:lblOffset val="100"/>
         <c:baseTimeUnit val="months"/>
       </c:dateAx>
       <c:valAx>
-        <c:axId val="2121519800"/>
+        <c:axId val="67097728"/>
         <c:scaling>
           <c:orientation val="minMax"/>
         </c:scaling>
-        <c:delete val="0"/>
         <c:axPos val="l"/>
         <c:majorGridlines/>
         <c:numFmt formatCode="General" sourceLinked="1"/>
-        <c:majorTickMark val="out"/>
-        <c:minorTickMark val="none"/>
         <c:tickLblPos val="nextTo"/>
-        <c:crossAx val="2121674936"/>
+        <c:crossAx val="67034496"/>
         <c:crosses val="autoZero"/>
         <c:crossBetween val="between"/>
       </c:valAx>
     </c:plotArea>
     <c:plotVisOnly val="1"/>
     <c:dispBlanksAs val="gap"/>
-    <c:showDLblsOverMax val="0"/>
   </c:chart>
   <c:txPr>
     <a:bodyPr/>
@@ -282,9 +253,7 @@
       <a:endParaRPr lang="en-US"/>
     </a:p>
   </c:txPr>
-  <c:externalData r:id="rId1">
-    <c:autoUpdate val="0"/>
-  </c:externalData>
+  <c:externalData r:id="rId1"/>
 </c:chartSpace>
 </file>
 
@@ -371,7 +340,7 @@
             <a:fld id="{359111DE-1BA2-49A7-AE83-CFAA77982A4A}" type="datetimeFigureOut">
               <a:rPr lang="en-US" smtClean="0"/>
               <a:pPr/>
-              <a:t>4/22/15</a:t>
+              <a:t>4/23/2015</a:t>
             </a:fld>
             <a:endParaRPr lang="en-US"/>
           </a:p>
@@ -542,7 +511,7 @@
     </p:spTree>
     <p:extLst>
       <p:ext uri="{BB962C8B-B14F-4D97-AF65-F5344CB8AC3E}">
-        <p14:creationId xmlns:p14="http://schemas.microsoft.com/office/powerpoint/2010/main" val="1175721935"/>
+        <p14:creationId xmlns="" xmlns:p14="http://schemas.microsoft.com/office/powerpoint/2010/main" val="1175721935"/>
       </p:ext>
     </p:extLst>
   </p:cSld>
@@ -1360,7 +1329,7 @@
             <a:fld id="{1D8BD707-D9CF-40AE-B4C6-C98DA3205C09}" type="datetimeFigureOut">
               <a:rPr lang="en-US" smtClean="0"/>
               <a:pPr/>
-              <a:t>4/22/15</a:t>
+              <a:t>4/23/2015</a:t>
             </a:fld>
             <a:endParaRPr lang="en-US"/>
           </a:p>
@@ -1558,7 +1527,7 @@
             <a:fld id="{1D8BD707-D9CF-40AE-B4C6-C98DA3205C09}" type="datetimeFigureOut">
               <a:rPr lang="en-US" smtClean="0"/>
               <a:pPr/>
-              <a:t>4/22/15</a:t>
+              <a:t>4/23/2015</a:t>
             </a:fld>
             <a:endParaRPr lang="en-US"/>
           </a:p>
@@ -1745,7 +1714,7 @@
             <a:fld id="{1D8BD707-D9CF-40AE-B4C6-C98DA3205C09}" type="datetimeFigureOut">
               <a:rPr lang="en-US" smtClean="0"/>
               <a:pPr/>
-              <a:t>4/22/15</a:t>
+              <a:t>4/23/2015</a:t>
             </a:fld>
             <a:endParaRPr lang="en-US"/>
           </a:p>
@@ -1897,7 +1866,7 @@
             <a:fld id="{1D8BD707-D9CF-40AE-B4C6-C98DA3205C09}" type="datetimeFigureOut">
               <a:rPr lang="en-US" smtClean="0"/>
               <a:pPr/>
-              <a:t>4/22/15</a:t>
+              <a:t>4/23/2015</a:t>
             </a:fld>
             <a:endParaRPr lang="en-US"/>
           </a:p>
@@ -2154,7 +2123,7 @@
             <a:fld id="{1D8BD707-D9CF-40AE-B4C6-C98DA3205C09}" type="datetimeFigureOut">
               <a:rPr lang="en-US" smtClean="0"/>
               <a:pPr/>
-              <a:t>4/22/15</a:t>
+              <a:t>4/23/2015</a:t>
             </a:fld>
             <a:endParaRPr lang="en-US"/>
           </a:p>
@@ -2565,7 +2534,7 @@
             <a:fld id="{1D8BD707-D9CF-40AE-B4C6-C98DA3205C09}" type="datetimeFigureOut">
               <a:rPr lang="en-US" smtClean="0"/>
               <a:pPr/>
-              <a:t>4/22/15</a:t>
+              <a:t>4/23/2015</a:t>
             </a:fld>
             <a:endParaRPr lang="en-US"/>
           </a:p>
@@ -3013,7 +2982,7 @@
             <a:fld id="{1D8BD707-D9CF-40AE-B4C6-C98DA3205C09}" type="datetimeFigureOut">
               <a:rPr lang="en-US" smtClean="0"/>
               <a:pPr/>
-              <a:t>4/22/15</a:t>
+              <a:t>4/23/2015</a:t>
             </a:fld>
             <a:endParaRPr lang="en-US"/>
           </a:p>
@@ -3116,7 +3085,7 @@
             <a:fld id="{1D8BD707-D9CF-40AE-B4C6-C98DA3205C09}" type="datetimeFigureOut">
               <a:rPr lang="en-US" smtClean="0"/>
               <a:pPr/>
-              <a:t>4/22/15</a:t>
+              <a:t>4/23/2015</a:t>
             </a:fld>
             <a:endParaRPr lang="en-US"/>
           </a:p>
@@ -3239,7 +3208,7 @@
             <a:fld id="{1D8BD707-D9CF-40AE-B4C6-C98DA3205C09}" type="datetimeFigureOut">
               <a:rPr lang="en-US" smtClean="0"/>
               <a:pPr/>
-              <a:t>4/22/15</a:t>
+              <a:t>4/23/2015</a:t>
             </a:fld>
             <a:endParaRPr lang="en-US"/>
           </a:p>
@@ -3515,7 +3484,7 @@
             <a:fld id="{1D8BD707-D9CF-40AE-B4C6-C98DA3205C09}" type="datetimeFigureOut">
               <a:rPr lang="en-US" smtClean="0"/>
               <a:pPr/>
-              <a:t>4/22/15</a:t>
+              <a:t>4/23/2015</a:t>
             </a:fld>
             <a:endParaRPr lang="en-US"/>
           </a:p>
@@ -3722,7 +3691,7 @@
             <a:fld id="{1D8BD707-D9CF-40AE-B4C6-C98DA3205C09}" type="datetimeFigureOut">
               <a:rPr lang="en-US" smtClean="0"/>
               <a:pPr/>
-              <a:t>4/22/15</a:t>
+              <a:t>4/23/2015</a:t>
             </a:fld>
             <a:endParaRPr lang="en-US"/>
           </a:p>
@@ -4833,7 +4802,7 @@
             <a:fld id="{1D8BD707-D9CF-40AE-B4C6-C98DA3205C09}" type="datetimeFigureOut">
               <a:rPr lang="en-US" smtClean="0"/>
               <a:pPr/>
-              <a:t>4/22/15</a:t>
+              <a:t>4/23/2015</a:t>
             </a:fld>
             <a:endParaRPr lang="en-US"/>
           </a:p>
@@ -5363,7 +5332,7 @@
   <p:timing>
     <p:tnLst>
       <p:par>
-        <p:cTn xmlns:p14="http://schemas.microsoft.com/office/powerpoint/2010/main" id="1" dur="indefinite" restart="never" nodeType="tmRoot"/>
+        <p:cTn id="1" dur="indefinite" restart="never" nodeType="tmRoot"/>
       </p:par>
     </p:tnLst>
   </p:timing>
@@ -5884,7 +5853,7 @@
   <p:timing>
     <p:tnLst>
       <p:par>
-        <p:cTn xmlns:p14="http://schemas.microsoft.com/office/powerpoint/2010/main" id="1" dur="indefinite" restart="never" nodeType="tmRoot"/>
+        <p:cTn id="1" dur="indefinite" restart="never" nodeType="tmRoot"/>
       </p:par>
     </p:tnLst>
   </p:timing>
@@ -6048,35 +6017,26 @@
       </p:pic>
       <p:pic>
         <p:nvPicPr>
-          <p:cNvPr id="2050" name="Picture 2"/>
+          <p:cNvPr id="6" name="Picture 5" descr="Capture.PNG"/>
           <p:cNvPicPr>
-            <a:picLocks noChangeAspect="1" noChangeArrowheads="1"/>
+            <a:picLocks noChangeAspect="1"/>
           </p:cNvPicPr>
           <p:nvPr/>
         </p:nvPicPr>
         <p:blipFill>
           <a:blip r:embed="rId3"/>
-          <a:srcRect/>
           <a:stretch>
             <a:fillRect/>
           </a:stretch>
         </p:blipFill>
-        <p:spPr bwMode="auto">
-          <a:xfrm>
-            <a:off x="0" y="3880126"/>
-            <a:ext cx="9144000" cy="2977874"/>
+        <p:spPr>
+          <a:xfrm>
+            <a:off x="0" y="3733800"/>
+            <a:ext cx="9144000" cy="3200400"/>
           </a:xfrm>
           <a:prstGeom prst="rect">
             <a:avLst/>
           </a:prstGeom>
-          <a:noFill/>
-          <a:ln w="9525">
-            <a:noFill/>
-            <a:miter lim="800000"/>
-            <a:headEnd/>
-            <a:tailEnd/>
-          </a:ln>
-          <a:effectLst/>
         </p:spPr>
       </p:pic>
     </p:spTree>
@@ -6087,7 +6047,7 @@
   <p:timing>
     <p:tnLst>
       <p:par>
-        <p:cTn xmlns:p14="http://schemas.microsoft.com/office/powerpoint/2010/main" id="1" dur="indefinite" restart="never" nodeType="tmRoot"/>
+        <p:cTn id="1" dur="indefinite" restart="never" nodeType="tmRoot"/>
       </p:par>
     </p:tnLst>
   </p:timing>
@@ -6249,7 +6209,7 @@
   <p:timing>
     <p:tnLst>
       <p:par>
-        <p:cTn xmlns:p14="http://schemas.microsoft.com/office/powerpoint/2010/main" id="1" dur="indefinite" restart="never" nodeType="tmRoot"/>
+        <p:cTn id="1" dur="indefinite" restart="never" nodeType="tmRoot"/>
       </p:par>
     </p:tnLst>
   </p:timing>
@@ -7015,7 +6975,7 @@
   <p:timing>
     <p:tnLst>
       <p:par>
-        <p:cTn xmlns:p14="http://schemas.microsoft.com/office/powerpoint/2010/main" id="1" dur="indefinite" restart="never" nodeType="tmRoot"/>
+        <p:cTn id="1" dur="indefinite" restart="never" nodeType="tmRoot"/>
       </p:par>
     </p:tnLst>
   </p:timing>
@@ -7078,36 +7038,22 @@
                 <a:latin typeface="Arial" pitchFamily="34" charset="0"/>
                 <a:cs typeface="Arial" pitchFamily="34" charset="0"/>
               </a:rPr>
-              <a:t> price analysis</a:t>
-            </a:r>
-            <a:r>
-              <a:rPr lang="en-US" dirty="0" smtClean="0">
-                <a:latin typeface="Arial" pitchFamily="34" charset="0"/>
-                <a:cs typeface="Arial" pitchFamily="34" charset="0"/>
-              </a:rPr>
-              <a:t>?</a:t>
-            </a:r>
-          </a:p>
-          <a:p>
-            <a:pPr lvl="1" algn="just">
+              <a:t> price analysis?</a:t>
+            </a:r>
+          </a:p>
+          <a:p>
+            <a:pPr algn="just">
               <a:spcAft>
                 <a:spcPts val="600"/>
               </a:spcAft>
             </a:pPr>
-            <a:r>
-              <a:rPr lang="en-US" dirty="0" smtClean="0">
-                <a:latin typeface="Arial" pitchFamily="34" charset="0"/>
-                <a:cs typeface="Arial" pitchFamily="34" charset="0"/>
-              </a:rPr>
-              <a:t>To account for the huge variance</a:t>
-            </a:r>
-            <a:endParaRPr lang="en-US" dirty="0" smtClean="0">
+            <a:endParaRPr lang="en-US" sz="2700" dirty="0" smtClean="0">
               <a:latin typeface="Arial" pitchFamily="34" charset="0"/>
               <a:cs typeface="Arial" pitchFamily="34" charset="0"/>
             </a:endParaRPr>
           </a:p>
           <a:p>
-            <a:pPr lvl="2" algn="just">
+            <a:pPr algn="just">
               <a:spcAft>
                 <a:spcPts val="600"/>
               </a:spcAft>
@@ -7117,18 +7063,11 @@
                 <a:latin typeface="Arial" pitchFamily="34" charset="0"/>
                 <a:cs typeface="Arial" pitchFamily="34" charset="0"/>
               </a:rPr>
-              <a:t>Google </a:t>
-            </a:r>
-            <a:r>
-              <a:rPr lang="en-US" dirty="0" smtClean="0">
-                <a:latin typeface="Arial" pitchFamily="34" charset="0"/>
-                <a:cs typeface="Arial" pitchFamily="34" charset="0"/>
-              </a:rPr>
-              <a:t>search trend</a:t>
-            </a:r>
-          </a:p>
-          <a:p>
-            <a:pPr lvl="2" algn="just">
+              <a:t>Google search trend</a:t>
+            </a:r>
+          </a:p>
+          <a:p>
+            <a:pPr algn="just">
               <a:spcAft>
                 <a:spcPts val="600"/>
               </a:spcAft>
@@ -7140,7 +7079,7 @@
               </a:rPr>
               <a:t>News Sentimental analysis</a:t>
             </a:r>
-            <a:endParaRPr lang="en-US" sz="2100" dirty="0" smtClean="0">
+            <a:endParaRPr lang="en-US" sz="2700" dirty="0" smtClean="0">
               <a:latin typeface="Arial" pitchFamily="34" charset="0"/>
               <a:cs typeface="Arial" pitchFamily="34" charset="0"/>
             </a:endParaRPr>
@@ -7311,7 +7250,7 @@
   <p:timing>
     <p:tnLst>
       <p:par>
-        <p:cTn xmlns:p14="http://schemas.microsoft.com/office/powerpoint/2010/main" id="1" dur="indefinite" restart="never" nodeType="tmRoot"/>
+        <p:cTn id="1" dur="indefinite" restart="never" nodeType="tmRoot"/>
       </p:par>
     </p:tnLst>
   </p:timing>
@@ -7381,11 +7320,7 @@
           <a:p>
             <a:r>
               <a:rPr lang="en-US" dirty="0" smtClean="0"/>
-              <a:t>Google </a:t>
-            </a:r>
-            <a:r>
-              <a:rPr lang="en-US" dirty="0" smtClean="0"/>
-              <a:t>search analysis</a:t>
+              <a:t>Google trend analysis</a:t>
             </a:r>
             <a:endParaRPr lang="en-US" dirty="0"/>
           </a:p>
@@ -7483,6 +7418,17 @@
               </a:rPr>
               <a:t>Invest</a:t>
             </a:r>
+            <a:endParaRPr lang="en-US" dirty="0">
+              <a:latin typeface="Arial" pitchFamily="34" charset="0"/>
+              <a:cs typeface="Arial" pitchFamily="34" charset="0"/>
+            </a:endParaRPr>
+          </a:p>
+          <a:p>
+            <a:pPr algn="just">
+              <a:spcAft>
+                <a:spcPts val="600"/>
+              </a:spcAft>
+            </a:pPr>
             <a:endParaRPr lang="en-US" dirty="0" smtClean="0">
               <a:latin typeface="Arial" pitchFamily="34" charset="0"/>
               <a:cs typeface="Arial" pitchFamily="34" charset="0"/>
@@ -7528,7 +7474,7 @@
           <a:blip r:embed="rId3">
             <a:extLst>
               <a:ext uri="{28A0092B-C50C-407E-A947-70E740481C1C}">
-                <a14:useLocalDpi xmlns:a14="http://schemas.microsoft.com/office/drawing/2010/main" val="0"/>
+                <a14:useLocalDpi xmlns="" xmlns:a14="http://schemas.microsoft.com/office/drawing/2010/main" val="0"/>
               </a:ext>
             </a:extLst>
           </a:blip>
@@ -7549,7 +7495,7 @@
     </p:spTree>
     <p:extLst>
       <p:ext uri="{BB962C8B-B14F-4D97-AF65-F5344CB8AC3E}">
-        <p14:creationId xmlns:p14="http://schemas.microsoft.com/office/powerpoint/2010/main" val="1561910368"/>
+        <p14:creationId xmlns="" xmlns:p14="http://schemas.microsoft.com/office/powerpoint/2010/main" val="1561910368"/>
       </p:ext>
     </p:extLst>
   </p:cSld>
@@ -7559,7 +7505,7 @@
   <p:timing>
     <p:tnLst>
       <p:par>
-        <p:cTn xmlns:p14="http://schemas.microsoft.com/office/powerpoint/2010/main" id="1" dur="indefinite" restart="never" nodeType="tmRoot"/>
+        <p:cTn id="1" dur="indefinite" restart="never" nodeType="tmRoot"/>
       </p:par>
     </p:tnLst>
   </p:timing>
@@ -7629,11 +7575,7 @@
           <a:p>
             <a:r>
               <a:rPr lang="en-US" dirty="0" smtClean="0"/>
-              <a:t>Google </a:t>
-            </a:r>
-            <a:r>
-              <a:rPr lang="en-US" dirty="0" smtClean="0"/>
-              <a:t>search analysis</a:t>
+              <a:t>Google trend analysis</a:t>
             </a:r>
             <a:endParaRPr lang="en-US" dirty="0"/>
           </a:p>
@@ -7657,7 +7599,7 @@
         </p:spPr>
         <p:txBody>
           <a:bodyPr>
-            <a:normAutofit fontScale="92500"/>
+            <a:normAutofit lnSpcReduction="10000"/>
           </a:bodyPr>
           <a:lstStyle/>
           <a:p>
@@ -7720,28 +7662,7 @@
                 <a:latin typeface="Arial" pitchFamily="34" charset="0"/>
                 <a:cs typeface="Arial" pitchFamily="34" charset="0"/>
               </a:rPr>
-              <a:t>Google search interest </a:t>
-            </a:r>
-            <a:r>
-              <a:rPr lang="en-US" dirty="0" smtClean="0">
-                <a:latin typeface="Arial" pitchFamily="34" charset="0"/>
-                <a:cs typeface="Arial" pitchFamily="34" charset="0"/>
-              </a:rPr>
-              <a:t>(</a:t>
-            </a:r>
-            <a:r>
-              <a:rPr lang="en-US" dirty="0" smtClean="0">
-                <a:latin typeface="Arial" pitchFamily="34" charset="0"/>
-                <a:cs typeface="Arial" pitchFamily="34" charset="0"/>
-              </a:rPr>
-              <a:t>SI</a:t>
-            </a:r>
-            <a:r>
-              <a:rPr lang="en-US" dirty="0" smtClean="0">
-                <a:latin typeface="Arial" pitchFamily="34" charset="0"/>
-                <a:cs typeface="Arial" pitchFamily="34" charset="0"/>
-              </a:rPr>
-              <a:t>)</a:t>
+              <a:t>Google search interest index (SI): 0-100</a:t>
             </a:r>
           </a:p>
           <a:p>
@@ -7755,45 +7676,6 @@
                 <a:latin typeface="Arial" pitchFamily="34" charset="0"/>
                 <a:cs typeface="Arial" pitchFamily="34" charset="0"/>
               </a:rPr>
-              <a:t>Weekly index (</a:t>
-            </a:r>
-            <a:r>
-              <a:rPr lang="en-US" dirty="0" smtClean="0">
-                <a:latin typeface="Arial" pitchFamily="34" charset="0"/>
-                <a:cs typeface="Arial" pitchFamily="34" charset="0"/>
-              </a:rPr>
-              <a:t>0</a:t>
-            </a:r>
-            <a:r>
-              <a:rPr lang="en-US" dirty="0" smtClean="0">
-                <a:latin typeface="Arial" pitchFamily="34" charset="0"/>
-                <a:cs typeface="Arial" pitchFamily="34" charset="0"/>
-              </a:rPr>
-              <a:t>-</a:t>
-            </a:r>
-            <a:r>
-              <a:rPr lang="en-US" dirty="0" smtClean="0">
-                <a:latin typeface="Arial" pitchFamily="34" charset="0"/>
-                <a:cs typeface="Arial" pitchFamily="34" charset="0"/>
-              </a:rPr>
-              <a:t>100)</a:t>
-            </a:r>
-            <a:endParaRPr lang="en-US" dirty="0" smtClean="0">
-              <a:latin typeface="Arial" pitchFamily="34" charset="0"/>
-              <a:cs typeface="Arial" pitchFamily="34" charset="0"/>
-            </a:endParaRPr>
-          </a:p>
-          <a:p>
-            <a:pPr lvl="2" algn="just">
-              <a:spcAft>
-                <a:spcPts val="600"/>
-              </a:spcAft>
-            </a:pPr>
-            <a:r>
-              <a:rPr lang="en-US" dirty="0" smtClean="0">
-                <a:latin typeface="Arial" pitchFamily="34" charset="0"/>
-                <a:cs typeface="Arial" pitchFamily="34" charset="0"/>
-              </a:rPr>
               <a:t>Keyword: </a:t>
             </a:r>
             <a:r>
@@ -7880,7 +7762,7 @@
     </p:spTree>
     <p:extLst>
       <p:ext uri="{BB962C8B-B14F-4D97-AF65-F5344CB8AC3E}">
-        <p14:creationId xmlns:p14="http://schemas.microsoft.com/office/powerpoint/2010/main" val="1898863101"/>
+        <p14:creationId xmlns="" xmlns:p14="http://schemas.microsoft.com/office/powerpoint/2010/main" val="1898863101"/>
       </p:ext>
     </p:extLst>
   </p:cSld>
@@ -7890,7 +7772,7 @@
   <p:timing>
     <p:tnLst>
       <p:par>
-        <p:cTn xmlns:p14="http://schemas.microsoft.com/office/powerpoint/2010/main" id="1" dur="indefinite" restart="never" nodeType="tmRoot"/>
+        <p:cTn id="1" dur="indefinite" restart="never" nodeType="tmRoot"/>
       </p:par>
     </p:tnLst>
   </p:timing>
@@ -8031,7 +7913,7 @@
           <a:blip r:embed="rId3">
             <a:extLst>
               <a:ext uri="{28A0092B-C50C-407E-A947-70E740481C1C}">
-                <a14:useLocalDpi xmlns:a14="http://schemas.microsoft.com/office/drawing/2010/main" val="0"/>
+                <a14:useLocalDpi xmlns="" xmlns:a14="http://schemas.microsoft.com/office/drawing/2010/main" val="0"/>
               </a:ext>
             </a:extLst>
           </a:blip>
@@ -8081,7 +7963,7 @@
     </p:spTree>
     <p:extLst>
       <p:ext uri="{BB962C8B-B14F-4D97-AF65-F5344CB8AC3E}">
-        <p14:creationId xmlns:p14="http://schemas.microsoft.com/office/powerpoint/2010/main" val="2383779861"/>
+        <p14:creationId xmlns="" xmlns:p14="http://schemas.microsoft.com/office/powerpoint/2010/main" val="2383779861"/>
       </p:ext>
     </p:extLst>
   </p:cSld>
@@ -8091,7 +7973,7 @@
   <p:timing>
     <p:tnLst>
       <p:par>
-        <p:cTn xmlns:p14="http://schemas.microsoft.com/office/powerpoint/2010/main" id="1" dur="indefinite" restart="never" nodeType="tmRoot"/>
+        <p:cTn id="1" dur="indefinite" restart="never" nodeType="tmRoot"/>
       </p:par>
     </p:tnLst>
   </p:timing>
@@ -8215,6 +8097,20 @@
             </a:r>
           </a:p>
           <a:p>
+            <a:pPr lvl="1" algn="just">
+              <a:spcAft>
+                <a:spcPts val="600"/>
+              </a:spcAft>
+            </a:pPr>
+            <a:r>
+              <a:rPr lang="en-US" dirty="0" smtClean="0">
+                <a:latin typeface="Arial" pitchFamily="34" charset="0"/>
+                <a:cs typeface="Arial" pitchFamily="34" charset="0"/>
+              </a:rPr>
+              <a:t>Given historical data</a:t>
+            </a:r>
+          </a:p>
+          <a:p>
             <a:pPr algn="just">
               <a:spcAft>
                 <a:spcPts val="600"/>
@@ -8225,14 +8121,7 @@
                 <a:latin typeface="Arial" pitchFamily="34" charset="0"/>
                 <a:cs typeface="Arial" pitchFamily="34" charset="0"/>
               </a:rPr>
-              <a:t>For </a:t>
-            </a:r>
-            <a:r>
-              <a:rPr lang="en-US" dirty="0" smtClean="0">
-                <a:latin typeface="Arial" pitchFamily="34" charset="0"/>
-                <a:cs typeface="Arial" pitchFamily="34" charset="0"/>
-              </a:rPr>
-              <a:t>week </a:t>
+              <a:t>For week </a:t>
             </a:r>
             <a:r>
               <a:rPr lang="en-US" dirty="0" err="1" smtClean="0">
@@ -8315,7 +8204,7 @@
     </p:spTree>
     <p:extLst>
       <p:ext uri="{BB962C8B-B14F-4D97-AF65-F5344CB8AC3E}">
-        <p14:creationId xmlns:p14="http://schemas.microsoft.com/office/powerpoint/2010/main" val="2938407280"/>
+        <p14:creationId xmlns="" xmlns:p14="http://schemas.microsoft.com/office/powerpoint/2010/main" val="2938407280"/>
       </p:ext>
     </p:extLst>
   </p:cSld>
@@ -8325,7 +8214,7 @@
   <p:timing>
     <p:tnLst>
       <p:par>
-        <p:cTn xmlns:p14="http://schemas.microsoft.com/office/powerpoint/2010/main" id="1" dur="indefinite" restart="never" nodeType="tmRoot"/>
+        <p:cTn id="1" dur="indefinite" restart="never" nodeType="tmRoot"/>
       </p:par>
     </p:tnLst>
   </p:timing>
@@ -8523,7 +8412,7 @@
     </p:spTree>
     <p:extLst>
       <p:ext uri="{BB962C8B-B14F-4D97-AF65-F5344CB8AC3E}">
-        <p14:creationId xmlns:p14="http://schemas.microsoft.com/office/powerpoint/2010/main" val="4004171504"/>
+        <p14:creationId xmlns="" xmlns:p14="http://schemas.microsoft.com/office/powerpoint/2010/main" val="4004171504"/>
       </p:ext>
     </p:extLst>
   </p:cSld>
@@ -8533,7 +8422,7 @@
   <p:timing>
     <p:tnLst>
       <p:par>
-        <p:cTn xmlns:p14="http://schemas.microsoft.com/office/powerpoint/2010/main" id="1" dur="indefinite" restart="never" nodeType="tmRoot"/>
+        <p:cTn id="1" dur="indefinite" restart="never" nodeType="tmRoot"/>
       </p:par>
     </p:tnLst>
   </p:timing>
@@ -8752,7 +8641,7 @@
   <p:timing>
     <p:tnLst>
       <p:par>
-        <p:cTn xmlns:p14="http://schemas.microsoft.com/office/powerpoint/2010/main" id="1" dur="indefinite" restart="never" nodeType="tmRoot"/>
+        <p:cTn id="1" dur="indefinite" restart="never" nodeType="tmRoot"/>
       </p:par>
     </p:tnLst>
   </p:timing>
@@ -8875,7 +8764,7 @@
           <a:blip r:embed="rId3">
             <a:extLst>
               <a:ext uri="{28A0092B-C50C-407E-A947-70E740481C1C}">
-                <a14:useLocalDpi xmlns:a14="http://schemas.microsoft.com/office/drawing/2010/main" val="0"/>
+                <a14:useLocalDpi xmlns="" xmlns:a14="http://schemas.microsoft.com/office/drawing/2010/main" val="0"/>
               </a:ext>
             </a:extLst>
           </a:blip>
@@ -8896,7 +8785,7 @@
     </p:spTree>
     <p:extLst>
       <p:ext uri="{BB962C8B-B14F-4D97-AF65-F5344CB8AC3E}">
-        <p14:creationId xmlns:p14="http://schemas.microsoft.com/office/powerpoint/2010/main" val="2248839819"/>
+        <p14:creationId xmlns="" xmlns:p14="http://schemas.microsoft.com/office/powerpoint/2010/main" val="2248839819"/>
       </p:ext>
     </p:extLst>
   </p:cSld>
@@ -8906,7 +8795,7 @@
   <p:timing>
     <p:tnLst>
       <p:par>
-        <p:cTn xmlns:p14="http://schemas.microsoft.com/office/powerpoint/2010/main" id="1" dur="indefinite" restart="never" nodeType="tmRoot"/>
+        <p:cTn id="1" dur="indefinite" restart="never" nodeType="tmRoot"/>
       </p:par>
     </p:tnLst>
   </p:timing>
@@ -9048,7 +8937,7 @@
     </p:spTree>
     <p:extLst>
       <p:ext uri="{BB962C8B-B14F-4D97-AF65-F5344CB8AC3E}">
-        <p14:creationId xmlns:p14="http://schemas.microsoft.com/office/powerpoint/2010/main" val="288134162"/>
+        <p14:creationId xmlns="" xmlns:p14="http://schemas.microsoft.com/office/powerpoint/2010/main" val="288134162"/>
       </p:ext>
     </p:extLst>
   </p:cSld>
@@ -9058,7 +8947,7 @@
   <p:timing>
     <p:tnLst>
       <p:par>
-        <p:cTn xmlns:p14="http://schemas.microsoft.com/office/powerpoint/2010/main" id="1" dur="indefinite" restart="never" nodeType="tmRoot"/>
+        <p:cTn id="1" dur="indefinite" restart="never" nodeType="tmRoot"/>
       </p:par>
     </p:tnLst>
   </p:timing>
@@ -9273,18 +9162,11 @@
             </a:r>
           </a:p>
           <a:p>
-            <a:pPr algn="just">
+            <a:pPr lvl="1" algn="just">
               <a:spcAft>
                 <a:spcPts val="600"/>
               </a:spcAft>
             </a:pPr>
-            <a:r>
-              <a:rPr lang="en-US" dirty="0" smtClean="0">
-                <a:latin typeface="Arial" pitchFamily="34" charset="0"/>
-                <a:cs typeface="Arial" pitchFamily="34" charset="0"/>
-              </a:rPr>
-              <a:t>Build an interactive graph for easier observation</a:t>
-            </a:r>
             <a:endParaRPr lang="en-US" dirty="0" smtClean="0">
               <a:latin typeface="Arial" pitchFamily="34" charset="0"/>
               <a:cs typeface="Arial" pitchFamily="34" charset="0"/>
@@ -9295,7 +9177,7 @@
     </p:spTree>
     <p:extLst>
       <p:ext uri="{BB962C8B-B14F-4D97-AF65-F5344CB8AC3E}">
-        <p14:creationId xmlns:p14="http://schemas.microsoft.com/office/powerpoint/2010/main" val="335122943"/>
+        <p14:creationId xmlns="" xmlns:p14="http://schemas.microsoft.com/office/powerpoint/2010/main" val="335122943"/>
       </p:ext>
     </p:extLst>
   </p:cSld>
@@ -9305,7 +9187,7 @@
   <p:timing>
     <p:tnLst>
       <p:par>
-        <p:cTn xmlns:p14="http://schemas.microsoft.com/office/powerpoint/2010/main" id="1" dur="indefinite" restart="never" nodeType="tmRoot"/>
+        <p:cTn id="1" dur="indefinite" restart="never" nodeType="tmRoot"/>
       </p:par>
     </p:tnLst>
   </p:timing>
@@ -9395,7 +9277,7 @@
           <a:blip r:embed="rId3">
             <a:extLst>
               <a:ext uri="{28A0092B-C50C-407E-A947-70E740481C1C}">
-                <a14:useLocalDpi xmlns:a14="http://schemas.microsoft.com/office/drawing/2010/main" val="0"/>
+                <a14:useLocalDpi xmlns="" xmlns:a14="http://schemas.microsoft.com/office/drawing/2010/main" val="0"/>
               </a:ext>
             </a:extLst>
           </a:blip>
@@ -9411,40 +9293,10 @@
           </a:xfrm>
         </p:spPr>
       </p:pic>
-      <p:sp>
-        <p:nvSpPr>
-          <p:cNvPr id="2" name="TextBox 1"/>
-          <p:cNvSpPr txBox="1"/>
-          <p:nvPr/>
-        </p:nvSpPr>
-        <p:spPr>
-          <a:xfrm>
-            <a:off x="3124200" y="5867400"/>
-            <a:ext cx="5900474" cy="369332"/>
-          </a:xfrm>
-          <a:prstGeom prst="rect">
-            <a:avLst/>
-          </a:prstGeom>
-          <a:noFill/>
-        </p:spPr>
-        <p:txBody>
-          <a:bodyPr wrap="none" rtlCol="0">
-            <a:spAutoFit/>
-          </a:bodyPr>
-          <a:lstStyle/>
-          <a:p>
-            <a:r>
-              <a:rPr lang="en-US" dirty="0" smtClean="0"/>
-              <a:t>Take away: only part of news has substantial effect</a:t>
-            </a:r>
-            <a:endParaRPr lang="en-US" dirty="0"/>
-          </a:p>
-        </p:txBody>
-      </p:sp>
     </p:spTree>
     <p:extLst>
       <p:ext uri="{BB962C8B-B14F-4D97-AF65-F5344CB8AC3E}">
-        <p14:creationId xmlns:p14="http://schemas.microsoft.com/office/powerpoint/2010/main" val="3429427913"/>
+        <p14:creationId xmlns="" xmlns:p14="http://schemas.microsoft.com/office/powerpoint/2010/main" val="3429427913"/>
       </p:ext>
     </p:extLst>
   </p:cSld>
@@ -9454,7 +9306,7 @@
   <p:timing>
     <p:tnLst>
       <p:par>
-        <p:cTn xmlns:p14="http://schemas.microsoft.com/office/powerpoint/2010/main" id="1" dur="indefinite" restart="never" nodeType="tmRoot"/>
+        <p:cTn id="1" dur="indefinite" restart="never" nodeType="tmRoot"/>
       </p:par>
     </p:tnLst>
   </p:timing>
@@ -9521,50 +9373,16 @@
                 <a:latin typeface="Arial" pitchFamily="34" charset="0"/>
                 <a:cs typeface="Arial" pitchFamily="34" charset="0"/>
               </a:rPr>
-              <a:t> price is not as good as analysis for the stock </a:t>
-            </a:r>
+              <a:t> price is not as good as analysis for the stock market;</a:t>
+            </a:r>
+          </a:p>
+          <a:p>
             <a:r>
               <a:rPr lang="en-US" dirty="0" smtClean="0">
                 <a:latin typeface="Arial" pitchFamily="34" charset="0"/>
                 <a:cs typeface="Arial" pitchFamily="34" charset="0"/>
               </a:rPr>
-              <a:t>market</a:t>
-            </a:r>
-            <a:r>
-              <a:rPr lang="zh-CN" altLang="en-US" dirty="0" smtClean="0">
-                <a:latin typeface="Arial" pitchFamily="34" charset="0"/>
-                <a:cs typeface="Arial" pitchFamily="34" charset="0"/>
-              </a:rPr>
-              <a:t>；</a:t>
-            </a:r>
-            <a:endParaRPr lang="en-US" altLang="zh-CN" dirty="0" smtClean="0">
-              <a:latin typeface="Arial" pitchFamily="34" charset="0"/>
-              <a:cs typeface="Arial" pitchFamily="34" charset="0"/>
-            </a:endParaRPr>
-          </a:p>
-          <a:p>
-            <a:r>
-              <a:rPr lang="en-US" dirty="0" smtClean="0">
-                <a:latin typeface="Arial" pitchFamily="34" charset="0"/>
-                <a:cs typeface="Arial" pitchFamily="34" charset="0"/>
-              </a:rPr>
-              <a:t>Alternative methods bear potential, but require specific tailoring</a:t>
-            </a:r>
-          </a:p>
-          <a:p>
-            <a:r>
-              <a:rPr lang="en-US" dirty="0" smtClean="0">
-                <a:latin typeface="Arial" pitchFamily="34" charset="0"/>
-                <a:cs typeface="Arial" pitchFamily="34" charset="0"/>
-              </a:rPr>
-              <a:t>More </a:t>
-            </a:r>
-            <a:r>
-              <a:rPr lang="en-US" dirty="0" smtClean="0">
-                <a:latin typeface="Arial" pitchFamily="34" charset="0"/>
-                <a:cs typeface="Arial" pitchFamily="34" charset="0"/>
-              </a:rPr>
-              <a:t>care needs to be taken to analyze </a:t>
+              <a:t>More care needs to be taken to analyze </a:t>
             </a:r>
             <a:r>
               <a:rPr lang="en-US" dirty="0" err="1" smtClean="0">
@@ -9658,7 +9476,7 @@
   <p:timing>
     <p:tnLst>
       <p:par>
-        <p:cTn xmlns:p14="http://schemas.microsoft.com/office/powerpoint/2010/main" id="1" dur="indefinite" restart="never" nodeType="tmRoot"/>
+        <p:cTn id="1" dur="indefinite" restart="never" nodeType="tmRoot"/>
       </p:par>
     </p:tnLst>
   </p:timing>
@@ -9744,7 +9562,7 @@
             <p:ph idx="1"/>
             <p:extLst>
               <p:ext uri="{D42A27DB-BD31-4B8C-83A1-F6EECF244321}">
-                <p14:modId xmlns:p14="http://schemas.microsoft.com/office/powerpoint/2010/main" val="3757271971"/>
+                <p14:modId xmlns="" xmlns:p14="http://schemas.microsoft.com/office/powerpoint/2010/main" val="3757271971"/>
               </p:ext>
             </p:extLst>
           </p:nvPr>
@@ -9767,7 +9585,7 @@
   <p:timing>
     <p:tnLst>
       <p:par>
-        <p:cTn xmlns:p14="http://schemas.microsoft.com/office/powerpoint/2010/main" id="1" dur="indefinite" restart="never" nodeType="tmRoot"/>
+        <p:cTn id="1" dur="indefinite" restart="never" nodeType="tmRoot"/>
       </p:par>
     </p:tnLst>
   </p:timing>
@@ -9953,7 +9771,7 @@
           <a:blip r:embed="rId3" cstate="print">
             <a:extLst>
               <a:ext uri="{28A0092B-C50C-407E-A947-70E740481C1C}">
-                <a14:useLocalDpi xmlns:a14="http://schemas.microsoft.com/office/drawing/2010/main" val="0"/>
+                <a14:useLocalDpi xmlns="" xmlns:a14="http://schemas.microsoft.com/office/drawing/2010/main" val="0"/>
               </a:ext>
             </a:extLst>
           </a:blip>
@@ -9983,7 +9801,7 @@
           <a:blip r:embed="rId4">
             <a:extLst>
               <a:ext uri="{28A0092B-C50C-407E-A947-70E740481C1C}">
-                <a14:useLocalDpi xmlns:a14="http://schemas.microsoft.com/office/drawing/2010/main" val="0"/>
+                <a14:useLocalDpi xmlns="" xmlns:a14="http://schemas.microsoft.com/office/drawing/2010/main" val="0"/>
               </a:ext>
             </a:extLst>
           </a:blip>
@@ -10049,7 +9867,7 @@
   <p:timing>
     <p:tnLst>
       <p:par>
-        <p:cTn xmlns:p14="http://schemas.microsoft.com/office/powerpoint/2010/main" id="1" dur="indefinite" restart="never" nodeType="tmRoot"/>
+        <p:cTn id="1" dur="indefinite" restart="never" nodeType="tmRoot"/>
       </p:par>
     </p:tnLst>
   </p:timing>
@@ -10231,7 +10049,7 @@
   <p:timing>
     <p:tnLst>
       <p:par>
-        <p:cTn xmlns:p14="http://schemas.microsoft.com/office/powerpoint/2010/main" id="1" dur="indefinite" restart="never" nodeType="tmRoot"/>
+        <p:cTn id="1" dur="indefinite" restart="never" nodeType="tmRoot"/>
       </p:par>
     </p:tnLst>
   </p:timing>
@@ -10408,7 +10226,7 @@
   <p:timing>
     <p:tnLst>
       <p:par>
-        <p:cTn xmlns:p14="http://schemas.microsoft.com/office/powerpoint/2010/main" id="1" dur="indefinite" restart="never" nodeType="tmRoot"/>
+        <p:cTn id="1" dur="indefinite" restart="never" nodeType="tmRoot"/>
       </p:par>
     </p:tnLst>
   </p:timing>
@@ -10578,7 +10396,7 @@
   <p:timing>
     <p:tnLst>
       <p:par>
-        <p:cTn xmlns:p14="http://schemas.microsoft.com/office/powerpoint/2010/main" id="1" dur="indefinite" restart="never" nodeType="tmRoot"/>
+        <p:cTn id="1" dur="indefinite" restart="never" nodeType="tmRoot"/>
       </p:par>
     </p:tnLst>
   </p:timing>
@@ -10766,7 +10584,7 @@
   <p:timing>
     <p:tnLst>
       <p:par>
-        <p:cTn xmlns:p14="http://schemas.microsoft.com/office/powerpoint/2010/main" id="1" dur="indefinite" restart="never" nodeType="tmRoot"/>
+        <p:cTn id="1" dur="indefinite" restart="never" nodeType="tmRoot"/>
       </p:par>
     </p:tnLst>
   </p:timing>
@@ -10954,7 +10772,7 @@
   <p:timing>
     <p:tnLst>
       <p:par>
-        <p:cTn xmlns:p14="http://schemas.microsoft.com/office/powerpoint/2010/main" id="1" dur="indefinite" restart="never" nodeType="tmRoot"/>
+        <p:cTn id="1" dur="indefinite" restart="never" nodeType="tmRoot"/>
       </p:par>
     </p:tnLst>
   </p:timing>

</xml_diff>